<commit_message>
added mapping between diagnosis codes
</commit_message>
<xml_diff>
--- a/data/raw/mimic3.pptx
+++ b/data/raw/mimic3.pptx
@@ -199,7 +199,7 @@
           <a:p>
             <a:fld id="{575C8F7D-52B4-4B8A-8E07-774B97E5C7B7}" type="datetimeFigureOut">
               <a:rPr lang="en-GB" smtClean="0"/>
-              <a:t>29/01/2023</a:t>
+              <a:t>30/01/2023</a:t>
             </a:fld>
             <a:endParaRPr lang="en-GB"/>
           </a:p>
@@ -850,7 +850,7 @@
           <a:p>
             <a:fld id="{A3561D85-F15F-4742-8CCB-1267DD67BFE9}" type="datetimeFigureOut">
               <a:rPr lang="en-GB" smtClean="0"/>
-              <a:t>29/01/2023</a:t>
+              <a:t>30/01/2023</a:t>
             </a:fld>
             <a:endParaRPr lang="en-GB"/>
           </a:p>
@@ -1020,7 +1020,7 @@
           <a:p>
             <a:fld id="{A3561D85-F15F-4742-8CCB-1267DD67BFE9}" type="datetimeFigureOut">
               <a:rPr lang="en-GB" smtClean="0"/>
-              <a:t>29/01/2023</a:t>
+              <a:t>30/01/2023</a:t>
             </a:fld>
             <a:endParaRPr lang="en-GB"/>
           </a:p>
@@ -1200,7 +1200,7 @@
           <a:p>
             <a:fld id="{A3561D85-F15F-4742-8CCB-1267DD67BFE9}" type="datetimeFigureOut">
               <a:rPr lang="en-GB" smtClean="0"/>
-              <a:t>29/01/2023</a:t>
+              <a:t>30/01/2023</a:t>
             </a:fld>
             <a:endParaRPr lang="en-GB"/>
           </a:p>
@@ -1370,7 +1370,7 @@
           <a:p>
             <a:fld id="{A3561D85-F15F-4742-8CCB-1267DD67BFE9}" type="datetimeFigureOut">
               <a:rPr lang="en-GB" smtClean="0"/>
-              <a:t>29/01/2023</a:t>
+              <a:t>30/01/2023</a:t>
             </a:fld>
             <a:endParaRPr lang="en-GB"/>
           </a:p>
@@ -1616,7 +1616,7 @@
           <a:p>
             <a:fld id="{A3561D85-F15F-4742-8CCB-1267DD67BFE9}" type="datetimeFigureOut">
               <a:rPr lang="en-GB" smtClean="0"/>
-              <a:t>29/01/2023</a:t>
+              <a:t>30/01/2023</a:t>
             </a:fld>
             <a:endParaRPr lang="en-GB"/>
           </a:p>
@@ -1848,7 +1848,7 @@
           <a:p>
             <a:fld id="{A3561D85-F15F-4742-8CCB-1267DD67BFE9}" type="datetimeFigureOut">
               <a:rPr lang="en-GB" smtClean="0"/>
-              <a:t>29/01/2023</a:t>
+              <a:t>30/01/2023</a:t>
             </a:fld>
             <a:endParaRPr lang="en-GB"/>
           </a:p>
@@ -2215,7 +2215,7 @@
           <a:p>
             <a:fld id="{A3561D85-F15F-4742-8CCB-1267DD67BFE9}" type="datetimeFigureOut">
               <a:rPr lang="en-GB" smtClean="0"/>
-              <a:t>29/01/2023</a:t>
+              <a:t>30/01/2023</a:t>
             </a:fld>
             <a:endParaRPr lang="en-GB"/>
           </a:p>
@@ -2333,7 +2333,7 @@
           <a:p>
             <a:fld id="{A3561D85-F15F-4742-8CCB-1267DD67BFE9}" type="datetimeFigureOut">
               <a:rPr lang="en-GB" smtClean="0"/>
-              <a:t>29/01/2023</a:t>
+              <a:t>30/01/2023</a:t>
             </a:fld>
             <a:endParaRPr lang="en-GB"/>
           </a:p>
@@ -2428,7 +2428,7 @@
           <a:p>
             <a:fld id="{A3561D85-F15F-4742-8CCB-1267DD67BFE9}" type="datetimeFigureOut">
               <a:rPr lang="en-GB" smtClean="0"/>
-              <a:t>29/01/2023</a:t>
+              <a:t>30/01/2023</a:t>
             </a:fld>
             <a:endParaRPr lang="en-GB"/>
           </a:p>
@@ -2705,7 +2705,7 @@
           <a:p>
             <a:fld id="{A3561D85-F15F-4742-8CCB-1267DD67BFE9}" type="datetimeFigureOut">
               <a:rPr lang="en-GB" smtClean="0"/>
-              <a:t>29/01/2023</a:t>
+              <a:t>30/01/2023</a:t>
             </a:fld>
             <a:endParaRPr lang="en-GB"/>
           </a:p>
@@ -2958,7 +2958,7 @@
           <a:p>
             <a:fld id="{A3561D85-F15F-4742-8CCB-1267DD67BFE9}" type="datetimeFigureOut">
               <a:rPr lang="en-GB" smtClean="0"/>
-              <a:t>29/01/2023</a:t>
+              <a:t>30/01/2023</a:t>
             </a:fld>
             <a:endParaRPr lang="en-GB"/>
           </a:p>
@@ -3171,7 +3171,7 @@
           <a:p>
             <a:fld id="{A3561D85-F15F-4742-8CCB-1267DD67BFE9}" type="datetimeFigureOut">
               <a:rPr lang="en-GB" smtClean="0"/>
-              <a:t>29/01/2023</a:t>
+              <a:t>30/01/2023</a:t>
             </a:fld>
             <a:endParaRPr lang="en-GB"/>
           </a:p>
@@ -3696,7 +3696,7 @@
         <p:spPr/>
         <p:txBody>
           <a:bodyPr>
-            <a:normAutofit/>
+            <a:normAutofit fontScale="92500"/>
           </a:bodyPr>
           <a:lstStyle/>
           <a:p>
@@ -3705,8 +3705,35 @@
                 <a:latin typeface="Roboto" panose="02000000000000000000" pitchFamily="2" charset="0"/>
                 <a:ea typeface="Roboto" panose="02000000000000000000" pitchFamily="2" charset="0"/>
               </a:rPr>
-              <a:t>40k patients</a:t>
-            </a:r>
+              <a:t>40k </a:t>
+            </a:r>
+            <a:r>
+              <a:rPr lang="en-GB" sz="4800" dirty="0" smtClean="0">
+                <a:latin typeface="Roboto" panose="02000000000000000000" pitchFamily="2" charset="0"/>
+                <a:ea typeface="Roboto" panose="02000000000000000000" pitchFamily="2" charset="0"/>
+              </a:rPr>
+              <a:t>patients </a:t>
+            </a:r>
+          </a:p>
+          <a:p>
+            <a:r>
+              <a:rPr lang="en-GB" sz="4800" dirty="0" smtClean="0">
+                <a:latin typeface="Roboto" panose="02000000000000000000" pitchFamily="2" charset="0"/>
+                <a:ea typeface="Roboto" panose="02000000000000000000" pitchFamily="2" charset="0"/>
+              </a:rPr>
+              <a:t>53k hospital admissions </a:t>
+            </a:r>
+            <a:r>
+              <a:rPr lang="en-GB" sz="4800" smtClean="0">
+                <a:latin typeface="Roboto" panose="02000000000000000000" pitchFamily="2" charset="0"/>
+                <a:ea typeface="Roboto" panose="02000000000000000000" pitchFamily="2" charset="0"/>
+              </a:rPr>
+              <a:t>(critical care) </a:t>
+            </a:r>
+            <a:endParaRPr lang="en-GB" sz="4800" dirty="0" smtClean="0">
+              <a:latin typeface="Roboto" panose="02000000000000000000" pitchFamily="2" charset="0"/>
+              <a:ea typeface="Roboto" panose="02000000000000000000" pitchFamily="2" charset="0"/>
+            </a:endParaRPr>
           </a:p>
           <a:p>
             <a:r>
@@ -3737,7 +3764,7 @@
           </a:p>
           <a:p>
             <a:r>
-              <a:rPr lang="en-GB" sz="4800" smtClean="0">
+              <a:rPr lang="en-GB" sz="4800" dirty="0" smtClean="0">
                 <a:latin typeface="Roboto" panose="02000000000000000000" pitchFamily="2" charset="0"/>
                 <a:ea typeface="Roboto" panose="02000000000000000000" pitchFamily="2" charset="0"/>
               </a:rPr>
@@ -3945,7 +3972,7 @@
         </p:nvSpPr>
         <p:spPr>
           <a:xfrm>
-            <a:off x="1422400" y="3913188"/>
+            <a:off x="1303528" y="3913188"/>
             <a:ext cx="2844800" cy="1165224"/>
           </a:xfrm>
           <a:prstGeom prst="roundRect">
@@ -4001,7 +4028,7 @@
         </p:nvSpPr>
         <p:spPr>
           <a:xfrm>
-            <a:off x="1524000" y="5257006"/>
+            <a:off x="1354328" y="5183854"/>
             <a:ext cx="2743200" cy="1230312"/>
           </a:xfrm>
           <a:prstGeom prst="roundRect">
@@ -4057,7 +4084,7 @@
         </p:nvSpPr>
         <p:spPr>
           <a:xfrm>
-            <a:off x="4724400" y="4495800"/>
+            <a:off x="4495800" y="4495800"/>
             <a:ext cx="2743200" cy="1230312"/>
           </a:xfrm>
           <a:prstGeom prst="roundRect">

</xml_diff>